<commit_message>
changes and updates in paper body text
</commit_message>
<xml_diff>
--- a/figures/images2prepare.pptx
+++ b/figures/images2prepare.pptx
@@ -8,6 +8,7 @@
     <p:sldId id="256" r:id="rId2"/>
     <p:sldId id="257" r:id="rId3"/>
     <p:sldId id="258" r:id="rId4"/>
+    <p:sldId id="259" r:id="rId5"/>
   </p:sldIdLst>
   <p:sldSz cx="9144000" cy="6858000" type="screen4x3"/>
   <p:notesSz cx="7559675" cy="10691813"/>
@@ -106,6 +107,11 @@
       </a:defRPr>
     </a:lvl9pPr>
   </p:defaultTextStyle>
+  <p:extLst>
+    <p:ext uri="{EFAFB233-063F-42B5-8137-9DF3F51BA10A}">
+      <p15:sldGuideLst xmlns:p15="http://schemas.microsoft.com/office/powerpoint/2012/main"/>
+    </p:ext>
+  </p:extLst>
 </p:presentation>
 </file>
 
@@ -2775,7 +2781,7 @@
                         </a:lnSpc>
                       </a:pPr>
                       <a:r>
-                        <a:rPr lang="ca-ES" sz="3200" b="0" strike="noStrike" spc="-1">
+                        <a:rPr lang="ca-ES" sz="3200" b="0" strike="noStrike" spc="-1" dirty="0">
                           <a:solidFill>
                             <a:srgbClr val="000000"/>
                           </a:solidFill>
@@ -2788,7 +2794,7 @@
                         </a:rPr>
                         <a:t></a:t>
                       </a:r>
-                      <a:endParaRPr lang="ca-ES" sz="1800" b="0" strike="noStrike" spc="-1">
+                      <a:endParaRPr lang="ca-ES" sz="1800" b="0" strike="noStrike" spc="-1" dirty="0">
                         <a:solidFill>
                           <a:srgbClr val="000000"/>
                         </a:solidFill>
@@ -2806,7 +2812,7 @@
                           <a:spcPct val="100000"/>
                         </a:lnSpc>
                       </a:pPr>
-                      <a:endParaRPr lang="ca-ES" sz="1800" b="0" strike="noStrike" spc="-1">
+                      <a:endParaRPr lang="ca-ES" sz="1800" b="0" strike="noStrike" spc="-1" dirty="0">
                         <a:solidFill>
                           <a:srgbClr val="000000"/>
                         </a:solidFill>
@@ -2919,7 +2925,7 @@
                         </a:lnSpc>
                       </a:pPr>
                       <a:r>
-                        <a:rPr lang="ca-ES" sz="3200" b="1" strike="noStrike" spc="-1">
+                        <a:rPr lang="ca-ES" sz="3200" b="1" strike="noStrike" spc="-1" dirty="0">
                           <a:solidFill>
                             <a:srgbClr val="000000"/>
                           </a:solidFill>
@@ -2932,7 +2938,7 @@
                         </a:rPr>
                         <a:t></a:t>
                       </a:r>
-                      <a:endParaRPr lang="ca-ES" sz="1800" b="0" strike="noStrike" spc="-1">
+                      <a:endParaRPr lang="ca-ES" sz="1800" b="0" strike="noStrike" spc="-1" dirty="0">
                         <a:solidFill>
                           <a:srgbClr val="000000"/>
                         </a:solidFill>
@@ -2989,7 +2995,7 @@
                         </a:lnSpc>
                       </a:pPr>
                       <a:r>
-                        <a:rPr lang="ca-ES" sz="3200" b="0" strike="noStrike" spc="-1">
+                        <a:rPr lang="ca-ES" sz="3200" b="0" strike="noStrike" spc="-1" dirty="0">
                           <a:solidFill>
                             <a:srgbClr val="000000"/>
                           </a:solidFill>
@@ -3002,7 +3008,7 @@
                         </a:rPr>
                         <a:t></a:t>
                       </a:r>
-                      <a:endParaRPr lang="ca-ES" sz="1800" b="0" strike="noStrike" spc="-1">
+                      <a:endParaRPr lang="ca-ES" sz="1800" b="0" strike="noStrike" spc="-1" dirty="0">
                         <a:solidFill>
                           <a:srgbClr val="000000"/>
                         </a:solidFill>
@@ -3020,7 +3026,7 @@
                           <a:spcPct val="100000"/>
                         </a:lnSpc>
                       </a:pPr>
-                      <a:endParaRPr lang="ca-ES" sz="1800" b="0" strike="noStrike" spc="-1">
+                      <a:endParaRPr lang="ca-ES" sz="1800" b="0" strike="noStrike" spc="-1" dirty="0">
                         <a:solidFill>
                           <a:srgbClr val="000000"/>
                         </a:solidFill>
@@ -3070,7 +3076,7 @@
                         </a:lnSpc>
                       </a:pPr>
                       <a:r>
-                        <a:rPr lang="ca-ES" sz="3200" b="0" strike="noStrike" spc="-1">
+                        <a:rPr lang="ca-ES" sz="3200" b="0" strike="noStrike" spc="-1" dirty="0">
                           <a:solidFill>
                             <a:srgbClr val="000000"/>
                           </a:solidFill>
@@ -3083,7 +3089,7 @@
                         </a:rPr>
                         <a:t></a:t>
                       </a:r>
-                      <a:endParaRPr lang="ca-ES" sz="1800" b="0" strike="noStrike" spc="-1">
+                      <a:endParaRPr lang="ca-ES" sz="1800" b="0" strike="noStrike" spc="-1" dirty="0">
                         <a:solidFill>
                           <a:srgbClr val="000000"/>
                         </a:solidFill>
@@ -3101,7 +3107,7 @@
                           <a:spcPct val="100000"/>
                         </a:lnSpc>
                       </a:pPr>
-                      <a:endParaRPr lang="ca-ES" sz="1800" b="0" strike="noStrike" spc="-1">
+                      <a:endParaRPr lang="ca-ES" sz="1800" b="0" strike="noStrike" spc="-1" dirty="0">
                         <a:solidFill>
                           <a:srgbClr val="000000"/>
                         </a:solidFill>
@@ -3151,7 +3157,7 @@
                         </a:lnSpc>
                       </a:pPr>
                       <a:r>
-                        <a:rPr lang="ca-ES" sz="3200" b="0" strike="noStrike" spc="-1">
+                        <a:rPr lang="ca-ES" sz="3200" b="0" strike="noStrike" spc="-1" dirty="0">
                           <a:solidFill>
                             <a:srgbClr val="000000"/>
                           </a:solidFill>
@@ -3164,7 +3170,7 @@
                         </a:rPr>
                         <a:t></a:t>
                       </a:r>
-                      <a:endParaRPr lang="ca-ES" sz="1800" b="0" strike="noStrike" spc="-1">
+                      <a:endParaRPr lang="ca-ES" sz="1800" b="0" strike="noStrike" spc="-1" dirty="0">
                         <a:solidFill>
                           <a:srgbClr val="000000"/>
                         </a:solidFill>
@@ -3182,7 +3188,7 @@
                           <a:spcPct val="100000"/>
                         </a:lnSpc>
                       </a:pPr>
-                      <a:endParaRPr lang="ca-ES" sz="1800" b="0" strike="noStrike" spc="-1">
+                      <a:endParaRPr lang="ca-ES" sz="1800" b="0" strike="noStrike" spc="-1" dirty="0">
                         <a:solidFill>
                           <a:srgbClr val="000000"/>
                         </a:solidFill>
@@ -4021,6 +4027,1345 @@
 </p:sld>
 </file>
 
+<file path=ppt/slides/slide4.xml><?xml version="1.0" encoding="utf-8"?>
+<p:sld xmlns:a="http://schemas.openxmlformats.org/drawingml/2006/main" xmlns:r="http://schemas.openxmlformats.org/officeDocument/2006/relationships" xmlns:p="http://schemas.openxmlformats.org/presentationml/2006/main">
+  <p:cSld>
+    <p:spTree>
+      <p:nvGrpSpPr>
+        <p:cNvPr id="1" name=""/>
+        <p:cNvGrpSpPr/>
+        <p:nvPr/>
+      </p:nvGrpSpPr>
+      <p:grpSpPr>
+        <a:xfrm>
+          <a:off x="0" y="0"/>
+          <a:ext cx="0" cy="0"/>
+          <a:chOff x="0" y="0"/>
+          <a:chExt cx="0" cy="0"/>
+        </a:xfrm>
+      </p:grpSpPr>
+      <p:grpSp>
+        <p:nvGrpSpPr>
+          <p:cNvPr id="8" name="Grupo 7"/>
+          <p:cNvGrpSpPr/>
+          <p:nvPr/>
+        </p:nvGrpSpPr>
+        <p:grpSpPr>
+          <a:xfrm>
+            <a:off x="713232" y="1432560"/>
+            <a:ext cx="6824928" cy="2678712"/>
+            <a:chOff x="713232" y="1432560"/>
+            <a:chExt cx="6824928" cy="2678712"/>
+          </a:xfrm>
+        </p:grpSpPr>
+        <p:graphicFrame>
+          <p:nvGraphicFramePr>
+            <p:cNvPr id="4" name="Table 1"/>
+            <p:cNvGraphicFramePr/>
+            <p:nvPr>
+              <p:extLst>
+                <p:ext uri="{D42A27DB-BD31-4B8C-83A1-F6EECF244321}">
+                  <p14:modId xmlns:p14="http://schemas.microsoft.com/office/powerpoint/2010/main" val="597579366"/>
+                </p:ext>
+              </p:extLst>
+            </p:nvPr>
+          </p:nvGraphicFramePr>
+          <p:xfrm>
+            <a:off x="1097280" y="1435608"/>
+            <a:ext cx="2804616" cy="2675664"/>
+          </p:xfrm>
+          <a:graphic>
+            <a:graphicData uri="http://schemas.openxmlformats.org/drawingml/2006/table">
+              <a:tbl>
+                <a:tblPr/>
+                <a:tblGrid>
+                  <a:gridCol w="934872">
+                    <a:extLst>
+                      <a:ext uri="{9D8B030D-6E8A-4147-A177-3AD203B41FA5}">
+                        <a16:colId xmlns:a16="http://schemas.microsoft.com/office/drawing/2014/main" val="20000"/>
+                      </a:ext>
+                    </a:extLst>
+                  </a:gridCol>
+                  <a:gridCol w="934872">
+                    <a:extLst>
+                      <a:ext uri="{9D8B030D-6E8A-4147-A177-3AD203B41FA5}">
+                        <a16:colId xmlns:a16="http://schemas.microsoft.com/office/drawing/2014/main" val="20001"/>
+                      </a:ext>
+                    </a:extLst>
+                  </a:gridCol>
+                  <a:gridCol w="934872">
+                    <a:extLst>
+                      <a:ext uri="{9D8B030D-6E8A-4147-A177-3AD203B41FA5}">
+                        <a16:colId xmlns:a16="http://schemas.microsoft.com/office/drawing/2014/main" val="20002"/>
+                      </a:ext>
+                    </a:extLst>
+                  </a:gridCol>
+                </a:tblGrid>
+                <a:tr h="774058">
+                  <a:tc>
+                    <a:txBody>
+                      <a:bodyPr/>
+                      <a:lstStyle/>
+                      <a:p>
+                        <a:pPr algn="ctr">
+                          <a:lnSpc>
+                            <a:spcPct val="100000"/>
+                          </a:lnSpc>
+                        </a:pPr>
+                        <a:r>
+                          <a:rPr lang="ca-ES" sz="1800" b="0" strike="noStrike" spc="-1" dirty="0" smtClean="0">
+                            <a:solidFill>
+                              <a:srgbClr val="FF0000"/>
+                            </a:solidFill>
+                            <a:uFill>
+                              <a:solidFill>
+                                <a:srgbClr val="FFFFFF"/>
+                              </a:solidFill>
+                            </a:uFill>
+                            <a:latin typeface="Arial"/>
+                          </a:rPr>
+                          <a:t>10</a:t>
+                        </a:r>
+                        <a:endParaRPr lang="ca-ES" sz="1800" b="0" strike="noStrike" spc="-1" dirty="0">
+                          <a:solidFill>
+                            <a:srgbClr val="FF0000"/>
+                          </a:solidFill>
+                          <a:uFill>
+                            <a:solidFill>
+                              <a:srgbClr val="FFFFFF"/>
+                            </a:solidFill>
+                          </a:uFill>
+                          <a:latin typeface="Arial"/>
+                        </a:endParaRPr>
+                      </a:p>
+                    </a:txBody>
+                    <a:tcPr anchor="ctr">
+                      <a:lnL w="18720">
+                        <a:solidFill>
+                          <a:srgbClr val="000000"/>
+                        </a:solidFill>
+                      </a:lnL>
+                      <a:lnR w="18720">
+                        <a:solidFill>
+                          <a:srgbClr val="000000"/>
+                        </a:solidFill>
+                      </a:lnR>
+                      <a:lnT w="18720">
+                        <a:solidFill>
+                          <a:srgbClr val="000000"/>
+                        </a:solidFill>
+                      </a:lnT>
+                      <a:lnB w="18720">
+                        <a:solidFill>
+                          <a:srgbClr val="000000"/>
+                        </a:solidFill>
+                      </a:lnB>
+                      <a:noFill/>
+                    </a:tcPr>
+                  </a:tc>
+                  <a:tc>
+                    <a:txBody>
+                      <a:bodyPr/>
+                      <a:lstStyle/>
+                      <a:p>
+                        <a:pPr algn="ctr">
+                          <a:lnSpc>
+                            <a:spcPct val="100000"/>
+                          </a:lnSpc>
+                        </a:pPr>
+                        <a:r>
+                          <a:rPr lang="ca-ES" sz="1800" b="0" strike="noStrike" spc="-1" dirty="0" smtClean="0">
+                            <a:solidFill>
+                              <a:srgbClr val="FF0000"/>
+                            </a:solidFill>
+                            <a:uFill>
+                              <a:solidFill>
+                                <a:srgbClr val="FFFFFF"/>
+                              </a:solidFill>
+                            </a:uFill>
+                            <a:latin typeface="Arial"/>
+                          </a:rPr>
+                          <a:t>20</a:t>
+                        </a:r>
+                        <a:endParaRPr lang="ca-ES" sz="1800" b="0" strike="noStrike" spc="-1" dirty="0">
+                          <a:solidFill>
+                            <a:srgbClr val="FF0000"/>
+                          </a:solidFill>
+                          <a:uFill>
+                            <a:solidFill>
+                              <a:srgbClr val="FFFFFF"/>
+                            </a:solidFill>
+                          </a:uFill>
+                          <a:latin typeface="Arial"/>
+                        </a:endParaRPr>
+                      </a:p>
+                    </a:txBody>
+                    <a:tcPr anchor="ctr">
+                      <a:lnL w="18720">
+                        <a:solidFill>
+                          <a:srgbClr val="000000"/>
+                        </a:solidFill>
+                      </a:lnL>
+                      <a:lnR w="18720">
+                        <a:solidFill>
+                          <a:srgbClr val="000000"/>
+                        </a:solidFill>
+                      </a:lnR>
+                      <a:lnT w="18720">
+                        <a:solidFill>
+                          <a:srgbClr val="000000"/>
+                        </a:solidFill>
+                      </a:lnT>
+                      <a:lnB w="18720">
+                        <a:solidFill>
+                          <a:srgbClr val="000000"/>
+                        </a:solidFill>
+                      </a:lnB>
+                      <a:noFill/>
+                    </a:tcPr>
+                  </a:tc>
+                  <a:tc>
+                    <a:txBody>
+                      <a:bodyPr/>
+                      <a:lstStyle/>
+                      <a:p>
+                        <a:pPr algn="ctr">
+                          <a:lnSpc>
+                            <a:spcPct val="100000"/>
+                          </a:lnSpc>
+                        </a:pPr>
+                        <a:r>
+                          <a:rPr lang="ca-ES" sz="1800" b="0" strike="noStrike" spc="-1" dirty="0" smtClean="0">
+                            <a:solidFill>
+                              <a:srgbClr val="FFC000"/>
+                            </a:solidFill>
+                            <a:uFill>
+                              <a:solidFill>
+                                <a:srgbClr val="FFFFFF"/>
+                              </a:solidFill>
+                            </a:uFill>
+                            <a:latin typeface="Arial"/>
+                          </a:rPr>
+                          <a:t>1</a:t>
+                        </a:r>
+                        <a:endParaRPr lang="ca-ES" sz="1800" b="0" strike="noStrike" spc="-1" dirty="0">
+                          <a:solidFill>
+                            <a:srgbClr val="FFC000"/>
+                          </a:solidFill>
+                          <a:uFill>
+                            <a:solidFill>
+                              <a:srgbClr val="FFFFFF"/>
+                            </a:solidFill>
+                          </a:uFill>
+                          <a:latin typeface="Arial"/>
+                        </a:endParaRPr>
+                      </a:p>
+                    </a:txBody>
+                    <a:tcPr anchor="ctr">
+                      <a:lnL w="18720">
+                        <a:solidFill>
+                          <a:srgbClr val="000000"/>
+                        </a:solidFill>
+                      </a:lnL>
+                      <a:lnR w="18720">
+                        <a:solidFill>
+                          <a:srgbClr val="000000"/>
+                        </a:solidFill>
+                      </a:lnR>
+                      <a:lnT w="18720">
+                        <a:solidFill>
+                          <a:srgbClr val="000000"/>
+                        </a:solidFill>
+                      </a:lnT>
+                      <a:lnB w="18720">
+                        <a:solidFill>
+                          <a:srgbClr val="000000"/>
+                        </a:solidFill>
+                      </a:lnB>
+                      <a:noFill/>
+                    </a:tcPr>
+                  </a:tc>
+                  <a:extLst>
+                    <a:ext uri="{0D108BD9-81ED-4DB2-BD59-A6C34878D82A}">
+                      <a16:rowId xmlns:a16="http://schemas.microsoft.com/office/drawing/2014/main" val="10000"/>
+                    </a:ext>
+                  </a:extLst>
+                </a:tr>
+                <a:tr h="950803">
+                  <a:tc>
+                    <a:txBody>
+                      <a:bodyPr/>
+                      <a:lstStyle/>
+                      <a:p>
+                        <a:pPr algn="ctr">
+                          <a:lnSpc>
+                            <a:spcPct val="100000"/>
+                          </a:lnSpc>
+                        </a:pPr>
+                        <a:r>
+                          <a:rPr lang="ca-ES" sz="1800" b="0" strike="noStrike" spc="-1" dirty="0" smtClean="0">
+                            <a:solidFill>
+                              <a:srgbClr val="FFC000"/>
+                            </a:solidFill>
+                            <a:uFill>
+                              <a:solidFill>
+                                <a:srgbClr val="FFFFFF"/>
+                              </a:solidFill>
+                            </a:uFill>
+                            <a:latin typeface="Arial"/>
+                          </a:rPr>
+                          <a:t>5</a:t>
+                        </a:r>
+                        <a:endParaRPr lang="ca-ES" sz="1800" b="0" strike="noStrike" spc="-1" dirty="0">
+                          <a:solidFill>
+                            <a:srgbClr val="FFC000"/>
+                          </a:solidFill>
+                          <a:uFill>
+                            <a:solidFill>
+                              <a:srgbClr val="FFFFFF"/>
+                            </a:solidFill>
+                          </a:uFill>
+                          <a:latin typeface="Arial"/>
+                        </a:endParaRPr>
+                      </a:p>
+                    </a:txBody>
+                    <a:tcPr anchor="ctr">
+                      <a:lnL w="18720">
+                        <a:solidFill>
+                          <a:srgbClr val="000000"/>
+                        </a:solidFill>
+                      </a:lnL>
+                      <a:lnR w="18720">
+                        <a:solidFill>
+                          <a:srgbClr val="000000"/>
+                        </a:solidFill>
+                      </a:lnR>
+                      <a:lnT w="18720">
+                        <a:solidFill>
+                          <a:srgbClr val="000000"/>
+                        </a:solidFill>
+                      </a:lnT>
+                      <a:lnB w="18720">
+                        <a:solidFill>
+                          <a:srgbClr val="000000"/>
+                        </a:solidFill>
+                      </a:lnB>
+                      <a:noFill/>
+                    </a:tcPr>
+                  </a:tc>
+                  <a:tc>
+                    <a:txBody>
+                      <a:bodyPr/>
+                      <a:lstStyle/>
+                      <a:p>
+                        <a:pPr algn="ctr">
+                          <a:lnSpc>
+                            <a:spcPct val="100000"/>
+                          </a:lnSpc>
+                        </a:pPr>
+                        <a:r>
+                          <a:rPr lang="ca-ES" sz="1800" b="0" strike="noStrike" spc="-1" dirty="0" smtClean="0">
+                            <a:solidFill>
+                              <a:srgbClr val="8A0000"/>
+                            </a:solidFill>
+                            <a:uFill>
+                              <a:solidFill>
+                                <a:srgbClr val="FFFFFF"/>
+                              </a:solidFill>
+                            </a:uFill>
+                            <a:latin typeface="Arial"/>
+                          </a:rPr>
+                          <a:t>40</a:t>
+                        </a:r>
+                        <a:endParaRPr lang="ca-ES" sz="1800" b="0" strike="noStrike" spc="-1" dirty="0">
+                          <a:solidFill>
+                            <a:srgbClr val="8A0000"/>
+                          </a:solidFill>
+                          <a:uFill>
+                            <a:solidFill>
+                              <a:srgbClr val="FFFFFF"/>
+                            </a:solidFill>
+                          </a:uFill>
+                          <a:latin typeface="Arial"/>
+                        </a:endParaRPr>
+                      </a:p>
+                    </a:txBody>
+                    <a:tcPr anchor="ctr">
+                      <a:lnL w="18720">
+                        <a:solidFill>
+                          <a:srgbClr val="000000"/>
+                        </a:solidFill>
+                      </a:lnL>
+                      <a:lnR w="18720">
+                        <a:solidFill>
+                          <a:srgbClr val="000000"/>
+                        </a:solidFill>
+                      </a:lnR>
+                      <a:lnT w="18720">
+                        <a:solidFill>
+                          <a:srgbClr val="000000"/>
+                        </a:solidFill>
+                      </a:lnT>
+                      <a:lnB w="18720">
+                        <a:solidFill>
+                          <a:srgbClr val="000000"/>
+                        </a:solidFill>
+                      </a:lnB>
+                      <a:noFill/>
+                    </a:tcPr>
+                  </a:tc>
+                  <a:tc>
+                    <a:txBody>
+                      <a:bodyPr/>
+                      <a:lstStyle/>
+                      <a:p>
+                        <a:pPr algn="ctr">
+                          <a:lnSpc>
+                            <a:spcPct val="100000"/>
+                          </a:lnSpc>
+                        </a:pPr>
+                        <a:r>
+                          <a:rPr lang="ca-ES" sz="1800" b="0" strike="noStrike" spc="-1" dirty="0" smtClean="0">
+                            <a:solidFill>
+                              <a:srgbClr val="FF0000"/>
+                            </a:solidFill>
+                            <a:uFill>
+                              <a:solidFill>
+                                <a:srgbClr val="FFFFFF"/>
+                              </a:solidFill>
+                            </a:uFill>
+                            <a:latin typeface="Arial"/>
+                          </a:rPr>
+                          <a:t>20</a:t>
+                        </a:r>
+                        <a:endParaRPr lang="ca-ES" sz="1800" b="0" strike="noStrike" spc="-1" dirty="0">
+                          <a:solidFill>
+                            <a:srgbClr val="FF0000"/>
+                          </a:solidFill>
+                          <a:uFill>
+                            <a:solidFill>
+                              <a:srgbClr val="FFFFFF"/>
+                            </a:solidFill>
+                          </a:uFill>
+                          <a:latin typeface="Arial"/>
+                        </a:endParaRPr>
+                      </a:p>
+                    </a:txBody>
+                    <a:tcPr anchor="ctr">
+                      <a:lnL w="18720">
+                        <a:solidFill>
+                          <a:srgbClr val="000000"/>
+                        </a:solidFill>
+                      </a:lnL>
+                      <a:lnR w="18720">
+                        <a:solidFill>
+                          <a:srgbClr val="000000"/>
+                        </a:solidFill>
+                      </a:lnR>
+                      <a:lnT w="18720">
+                        <a:solidFill>
+                          <a:srgbClr val="000000"/>
+                        </a:solidFill>
+                      </a:lnT>
+                      <a:lnB w="18720">
+                        <a:solidFill>
+                          <a:srgbClr val="000000"/>
+                        </a:solidFill>
+                      </a:lnB>
+                      <a:noFill/>
+                    </a:tcPr>
+                  </a:tc>
+                  <a:extLst>
+                    <a:ext uri="{0D108BD9-81ED-4DB2-BD59-A6C34878D82A}">
+                      <a16:rowId xmlns:a16="http://schemas.microsoft.com/office/drawing/2014/main" val="10001"/>
+                    </a:ext>
+                  </a:extLst>
+                </a:tr>
+                <a:tr h="950803">
+                  <a:tc>
+                    <a:txBody>
+                      <a:bodyPr/>
+                      <a:lstStyle/>
+                      <a:p>
+                        <a:pPr algn="ctr">
+                          <a:lnSpc>
+                            <a:spcPct val="100000"/>
+                          </a:lnSpc>
+                        </a:pPr>
+                        <a:r>
+                          <a:rPr lang="ca-ES" sz="1800" b="0" strike="noStrike" spc="-1" dirty="0" smtClean="0">
+                            <a:solidFill>
+                              <a:srgbClr val="FFC000"/>
+                            </a:solidFill>
+                            <a:uFill>
+                              <a:solidFill>
+                                <a:srgbClr val="FFFFFF"/>
+                              </a:solidFill>
+                            </a:uFill>
+                            <a:latin typeface="Arial"/>
+                          </a:rPr>
+                          <a:t>0</a:t>
+                        </a:r>
+                        <a:endParaRPr lang="ca-ES" sz="1800" b="0" strike="noStrike" spc="-1" dirty="0">
+                          <a:solidFill>
+                            <a:srgbClr val="FFC000"/>
+                          </a:solidFill>
+                          <a:uFill>
+                            <a:solidFill>
+                              <a:srgbClr val="FFFFFF"/>
+                            </a:solidFill>
+                          </a:uFill>
+                          <a:latin typeface="Arial"/>
+                        </a:endParaRPr>
+                      </a:p>
+                    </a:txBody>
+                    <a:tcPr anchor="ctr">
+                      <a:lnL w="18720">
+                        <a:solidFill>
+                          <a:srgbClr val="000000"/>
+                        </a:solidFill>
+                      </a:lnL>
+                      <a:lnR w="18720">
+                        <a:solidFill>
+                          <a:srgbClr val="000000"/>
+                        </a:solidFill>
+                      </a:lnR>
+                      <a:lnT w="18720">
+                        <a:solidFill>
+                          <a:srgbClr val="000000"/>
+                        </a:solidFill>
+                      </a:lnT>
+                      <a:lnB w="18720">
+                        <a:solidFill>
+                          <a:srgbClr val="000000"/>
+                        </a:solidFill>
+                      </a:lnB>
+                      <a:noFill/>
+                    </a:tcPr>
+                  </a:tc>
+                  <a:tc>
+                    <a:txBody>
+                      <a:bodyPr/>
+                      <a:lstStyle/>
+                      <a:p>
+                        <a:pPr algn="ctr">
+                          <a:lnSpc>
+                            <a:spcPct val="100000"/>
+                          </a:lnSpc>
+                        </a:pPr>
+                        <a:r>
+                          <a:rPr lang="ca-ES" sz="1800" b="0" strike="noStrike" spc="-1" dirty="0" smtClean="0">
+                            <a:solidFill>
+                              <a:srgbClr val="FFC000"/>
+                            </a:solidFill>
+                            <a:uFill>
+                              <a:solidFill>
+                                <a:srgbClr val="FFFFFF"/>
+                              </a:solidFill>
+                            </a:uFill>
+                            <a:latin typeface="Arial"/>
+                          </a:rPr>
+                          <a:t>5</a:t>
+                        </a:r>
+                        <a:endParaRPr lang="ca-ES" sz="1800" b="0" strike="noStrike" spc="-1" dirty="0">
+                          <a:solidFill>
+                            <a:srgbClr val="FFC000"/>
+                          </a:solidFill>
+                          <a:uFill>
+                            <a:solidFill>
+                              <a:srgbClr val="FFFFFF"/>
+                            </a:solidFill>
+                          </a:uFill>
+                          <a:latin typeface="Arial"/>
+                        </a:endParaRPr>
+                      </a:p>
+                    </a:txBody>
+                    <a:tcPr anchor="ctr">
+                      <a:lnL w="18720">
+                        <a:solidFill>
+                          <a:srgbClr val="000000"/>
+                        </a:solidFill>
+                      </a:lnL>
+                      <a:lnR w="18720">
+                        <a:solidFill>
+                          <a:srgbClr val="000000"/>
+                        </a:solidFill>
+                      </a:lnR>
+                      <a:lnT w="18720">
+                        <a:solidFill>
+                          <a:srgbClr val="000000"/>
+                        </a:solidFill>
+                      </a:lnT>
+                      <a:lnB w="18720">
+                        <a:solidFill>
+                          <a:srgbClr val="000000"/>
+                        </a:solidFill>
+                      </a:lnB>
+                      <a:noFill/>
+                    </a:tcPr>
+                  </a:tc>
+                  <a:tc>
+                    <a:txBody>
+                      <a:bodyPr/>
+                      <a:lstStyle/>
+                      <a:p>
+                        <a:pPr algn="ctr">
+                          <a:lnSpc>
+                            <a:spcPct val="100000"/>
+                          </a:lnSpc>
+                        </a:pPr>
+                        <a:r>
+                          <a:rPr lang="ca-ES" sz="1800" b="0" strike="noStrike" spc="-1" dirty="0" smtClean="0">
+                            <a:solidFill>
+                              <a:srgbClr val="FF0000"/>
+                            </a:solidFill>
+                            <a:uFill>
+                              <a:solidFill>
+                                <a:srgbClr val="FFFFFF"/>
+                              </a:solidFill>
+                            </a:uFill>
+                            <a:latin typeface="Arial"/>
+                          </a:rPr>
+                          <a:t>10</a:t>
+                        </a:r>
+                        <a:endParaRPr lang="ca-ES" sz="1800" b="0" strike="noStrike" spc="-1" dirty="0">
+                          <a:solidFill>
+                            <a:srgbClr val="FF0000"/>
+                          </a:solidFill>
+                          <a:uFill>
+                            <a:solidFill>
+                              <a:srgbClr val="FFFFFF"/>
+                            </a:solidFill>
+                          </a:uFill>
+                          <a:latin typeface="Arial"/>
+                        </a:endParaRPr>
+                      </a:p>
+                    </a:txBody>
+                    <a:tcPr anchor="ctr">
+                      <a:lnL w="18720">
+                        <a:solidFill>
+                          <a:srgbClr val="000000"/>
+                        </a:solidFill>
+                      </a:lnL>
+                      <a:lnR w="18720">
+                        <a:solidFill>
+                          <a:srgbClr val="000000"/>
+                        </a:solidFill>
+                      </a:lnR>
+                      <a:lnT w="18720">
+                        <a:solidFill>
+                          <a:srgbClr val="000000"/>
+                        </a:solidFill>
+                      </a:lnT>
+                      <a:lnB w="18720">
+                        <a:solidFill>
+                          <a:srgbClr val="000000"/>
+                        </a:solidFill>
+                      </a:lnB>
+                      <a:noFill/>
+                    </a:tcPr>
+                  </a:tc>
+                  <a:extLst>
+                    <a:ext uri="{0D108BD9-81ED-4DB2-BD59-A6C34878D82A}">
+                      <a16:rowId xmlns:a16="http://schemas.microsoft.com/office/drawing/2014/main" val="10002"/>
+                    </a:ext>
+                  </a:extLst>
+                </a:tr>
+              </a:tbl>
+            </a:graphicData>
+          </a:graphic>
+        </p:graphicFrame>
+        <p:graphicFrame>
+          <p:nvGraphicFramePr>
+            <p:cNvPr id="5" name="Table 1"/>
+            <p:cNvGraphicFramePr/>
+            <p:nvPr>
+              <p:extLst>
+                <p:ext uri="{D42A27DB-BD31-4B8C-83A1-F6EECF244321}">
+                  <p14:modId xmlns:p14="http://schemas.microsoft.com/office/powerpoint/2010/main" val="2359140920"/>
+                </p:ext>
+              </p:extLst>
+            </p:nvPr>
+          </p:nvGraphicFramePr>
+          <p:xfrm>
+            <a:off x="4733544" y="1432560"/>
+            <a:ext cx="2804616" cy="2675664"/>
+          </p:xfrm>
+          <a:graphic>
+            <a:graphicData uri="http://schemas.openxmlformats.org/drawingml/2006/table">
+              <a:tbl>
+                <a:tblPr/>
+                <a:tblGrid>
+                  <a:gridCol w="934872">
+                    <a:extLst>
+                      <a:ext uri="{9D8B030D-6E8A-4147-A177-3AD203B41FA5}">
+                        <a16:colId xmlns:a16="http://schemas.microsoft.com/office/drawing/2014/main" val="20000"/>
+                      </a:ext>
+                    </a:extLst>
+                  </a:gridCol>
+                  <a:gridCol w="934872">
+                    <a:extLst>
+                      <a:ext uri="{9D8B030D-6E8A-4147-A177-3AD203B41FA5}">
+                        <a16:colId xmlns:a16="http://schemas.microsoft.com/office/drawing/2014/main" val="20001"/>
+                      </a:ext>
+                    </a:extLst>
+                  </a:gridCol>
+                  <a:gridCol w="934872">
+                    <a:extLst>
+                      <a:ext uri="{9D8B030D-6E8A-4147-A177-3AD203B41FA5}">
+                        <a16:colId xmlns:a16="http://schemas.microsoft.com/office/drawing/2014/main" val="20002"/>
+                      </a:ext>
+                    </a:extLst>
+                  </a:gridCol>
+                </a:tblGrid>
+                <a:tr h="774058">
+                  <a:tc>
+                    <a:txBody>
+                      <a:bodyPr/>
+                      <a:lstStyle/>
+                      <a:p>
+                        <a:pPr algn="ctr">
+                          <a:lnSpc>
+                            <a:spcPct val="100000"/>
+                          </a:lnSpc>
+                        </a:pPr>
+                        <a:r>
+                          <a:rPr lang="ca-ES" sz="1800" b="0" strike="noStrike" spc="-1" dirty="0" smtClean="0">
+                            <a:solidFill>
+                              <a:srgbClr val="FFC000"/>
+                            </a:solidFill>
+                            <a:uFill>
+                              <a:solidFill>
+                                <a:srgbClr val="FFFFFF"/>
+                              </a:solidFill>
+                            </a:uFill>
+                            <a:latin typeface="Arial"/>
+                          </a:rPr>
+                          <a:t>4</a:t>
+                        </a:r>
+                        <a:endParaRPr lang="ca-ES" sz="1800" b="0" strike="noStrike" spc="-1" dirty="0">
+                          <a:solidFill>
+                            <a:srgbClr val="FFC000"/>
+                          </a:solidFill>
+                          <a:uFill>
+                            <a:solidFill>
+                              <a:srgbClr val="FFFFFF"/>
+                            </a:solidFill>
+                          </a:uFill>
+                          <a:latin typeface="Arial"/>
+                        </a:endParaRPr>
+                      </a:p>
+                    </a:txBody>
+                    <a:tcPr anchor="ctr">
+                      <a:lnL w="18720">
+                        <a:solidFill>
+                          <a:srgbClr val="000000"/>
+                        </a:solidFill>
+                      </a:lnL>
+                      <a:lnR w="18720">
+                        <a:solidFill>
+                          <a:srgbClr val="000000"/>
+                        </a:solidFill>
+                      </a:lnR>
+                      <a:lnT w="18720">
+                        <a:solidFill>
+                          <a:srgbClr val="000000"/>
+                        </a:solidFill>
+                      </a:lnT>
+                      <a:lnB w="18720">
+                        <a:solidFill>
+                          <a:srgbClr val="000000"/>
+                        </a:solidFill>
+                      </a:lnB>
+                      <a:noFill/>
+                    </a:tcPr>
+                  </a:tc>
+                  <a:tc>
+                    <a:txBody>
+                      <a:bodyPr/>
+                      <a:lstStyle/>
+                      <a:p>
+                        <a:pPr algn="ctr">
+                          <a:lnSpc>
+                            <a:spcPct val="100000"/>
+                          </a:lnSpc>
+                        </a:pPr>
+                        <a:r>
+                          <a:rPr lang="ca-ES" sz="1800" b="0" strike="noStrike" spc="-1" dirty="0" smtClean="0">
+                            <a:solidFill>
+                              <a:srgbClr val="FF0000"/>
+                            </a:solidFill>
+                            <a:uFill>
+                              <a:solidFill>
+                                <a:srgbClr val="FFFFFF"/>
+                              </a:solidFill>
+                            </a:uFill>
+                            <a:latin typeface="Arial"/>
+                          </a:rPr>
+                          <a:t>20</a:t>
+                        </a:r>
+                        <a:endParaRPr lang="ca-ES" sz="1800" b="0" strike="noStrike" spc="-1" dirty="0">
+                          <a:solidFill>
+                            <a:srgbClr val="FF0000"/>
+                          </a:solidFill>
+                          <a:uFill>
+                            <a:solidFill>
+                              <a:srgbClr val="FFFFFF"/>
+                            </a:solidFill>
+                          </a:uFill>
+                          <a:latin typeface="Arial"/>
+                        </a:endParaRPr>
+                      </a:p>
+                    </a:txBody>
+                    <a:tcPr anchor="ctr">
+                      <a:lnL w="18720">
+                        <a:solidFill>
+                          <a:srgbClr val="000000"/>
+                        </a:solidFill>
+                      </a:lnL>
+                      <a:lnR w="18720">
+                        <a:solidFill>
+                          <a:srgbClr val="000000"/>
+                        </a:solidFill>
+                      </a:lnR>
+                      <a:lnT w="18720">
+                        <a:solidFill>
+                          <a:srgbClr val="000000"/>
+                        </a:solidFill>
+                      </a:lnT>
+                      <a:lnB w="18720">
+                        <a:solidFill>
+                          <a:srgbClr val="000000"/>
+                        </a:solidFill>
+                      </a:lnB>
+                      <a:noFill/>
+                    </a:tcPr>
+                  </a:tc>
+                  <a:tc>
+                    <a:txBody>
+                      <a:bodyPr/>
+                      <a:lstStyle/>
+                      <a:p>
+                        <a:pPr algn="ctr">
+                          <a:lnSpc>
+                            <a:spcPct val="100000"/>
+                          </a:lnSpc>
+                        </a:pPr>
+                        <a:r>
+                          <a:rPr lang="ca-ES" sz="1800" b="0" strike="noStrike" spc="-1" dirty="0" smtClean="0">
+                            <a:solidFill>
+                              <a:srgbClr val="FFC000"/>
+                            </a:solidFill>
+                            <a:uFill>
+                              <a:solidFill>
+                                <a:srgbClr val="FFFFFF"/>
+                              </a:solidFill>
+                            </a:uFill>
+                            <a:latin typeface="Arial"/>
+                          </a:rPr>
+                          <a:t>5</a:t>
+                        </a:r>
+                        <a:endParaRPr lang="ca-ES" sz="1800" b="0" strike="noStrike" spc="-1" dirty="0">
+                          <a:solidFill>
+                            <a:srgbClr val="FFC000"/>
+                          </a:solidFill>
+                          <a:uFill>
+                            <a:solidFill>
+                              <a:srgbClr val="FFFFFF"/>
+                            </a:solidFill>
+                          </a:uFill>
+                          <a:latin typeface="Arial"/>
+                        </a:endParaRPr>
+                      </a:p>
+                    </a:txBody>
+                    <a:tcPr anchor="ctr">
+                      <a:lnL w="18720">
+                        <a:solidFill>
+                          <a:srgbClr val="000000"/>
+                        </a:solidFill>
+                      </a:lnL>
+                      <a:lnR w="18720">
+                        <a:solidFill>
+                          <a:srgbClr val="000000"/>
+                        </a:solidFill>
+                      </a:lnR>
+                      <a:lnT w="18720">
+                        <a:solidFill>
+                          <a:srgbClr val="000000"/>
+                        </a:solidFill>
+                      </a:lnT>
+                      <a:lnB w="18720">
+                        <a:solidFill>
+                          <a:srgbClr val="000000"/>
+                        </a:solidFill>
+                      </a:lnB>
+                      <a:noFill/>
+                    </a:tcPr>
+                  </a:tc>
+                  <a:extLst>
+                    <a:ext uri="{0D108BD9-81ED-4DB2-BD59-A6C34878D82A}">
+                      <a16:rowId xmlns:a16="http://schemas.microsoft.com/office/drawing/2014/main" val="10000"/>
+                    </a:ext>
+                  </a:extLst>
+                </a:tr>
+                <a:tr h="950803">
+                  <a:tc>
+                    <a:txBody>
+                      <a:bodyPr/>
+                      <a:lstStyle/>
+                      <a:p>
+                        <a:pPr algn="ctr">
+                          <a:lnSpc>
+                            <a:spcPct val="100000"/>
+                          </a:lnSpc>
+                        </a:pPr>
+                        <a:r>
+                          <a:rPr lang="ca-ES" sz="1800" b="0" strike="noStrike" spc="-1" dirty="0" smtClean="0">
+                            <a:solidFill>
+                              <a:srgbClr val="FFC000"/>
+                            </a:solidFill>
+                            <a:uFill>
+                              <a:solidFill>
+                                <a:srgbClr val="FFFFFF"/>
+                              </a:solidFill>
+                            </a:uFill>
+                            <a:latin typeface="Arial"/>
+                          </a:rPr>
+                          <a:t>1</a:t>
+                        </a:r>
+                        <a:endParaRPr lang="ca-ES" sz="1800" b="0" strike="noStrike" spc="-1" dirty="0">
+                          <a:solidFill>
+                            <a:srgbClr val="FFC000"/>
+                          </a:solidFill>
+                          <a:uFill>
+                            <a:solidFill>
+                              <a:srgbClr val="FFFFFF"/>
+                            </a:solidFill>
+                          </a:uFill>
+                          <a:latin typeface="Arial"/>
+                        </a:endParaRPr>
+                      </a:p>
+                    </a:txBody>
+                    <a:tcPr anchor="ctr">
+                      <a:lnL w="18720">
+                        <a:solidFill>
+                          <a:srgbClr val="000000"/>
+                        </a:solidFill>
+                      </a:lnL>
+                      <a:lnR w="18720">
+                        <a:solidFill>
+                          <a:srgbClr val="000000"/>
+                        </a:solidFill>
+                      </a:lnR>
+                      <a:lnT w="18720">
+                        <a:solidFill>
+                          <a:srgbClr val="000000"/>
+                        </a:solidFill>
+                      </a:lnT>
+                      <a:lnB w="18720">
+                        <a:solidFill>
+                          <a:srgbClr val="000000"/>
+                        </a:solidFill>
+                      </a:lnB>
+                      <a:noFill/>
+                    </a:tcPr>
+                  </a:tc>
+                  <a:tc>
+                    <a:txBody>
+                      <a:bodyPr/>
+                      <a:lstStyle/>
+                      <a:p>
+                        <a:pPr algn="ctr">
+                          <a:lnSpc>
+                            <a:spcPct val="100000"/>
+                          </a:lnSpc>
+                        </a:pPr>
+                        <a:r>
+                          <a:rPr lang="ca-ES" sz="1800" b="0" strike="noStrike" spc="-1" dirty="0" smtClean="0">
+                            <a:solidFill>
+                              <a:srgbClr val="8A0000"/>
+                            </a:solidFill>
+                            <a:uFill>
+                              <a:solidFill>
+                                <a:srgbClr val="FFFFFF"/>
+                              </a:solidFill>
+                            </a:uFill>
+                            <a:latin typeface="Arial"/>
+                          </a:rPr>
+                          <a:t>40</a:t>
+                        </a:r>
+                        <a:endParaRPr lang="ca-ES" sz="1800" b="0" strike="noStrike" spc="-1" dirty="0">
+                          <a:solidFill>
+                            <a:srgbClr val="8A0000"/>
+                          </a:solidFill>
+                          <a:uFill>
+                            <a:solidFill>
+                              <a:srgbClr val="FFFFFF"/>
+                            </a:solidFill>
+                          </a:uFill>
+                          <a:latin typeface="Arial"/>
+                        </a:endParaRPr>
+                      </a:p>
+                    </a:txBody>
+                    <a:tcPr anchor="ctr">
+                      <a:lnL w="18720">
+                        <a:solidFill>
+                          <a:srgbClr val="000000"/>
+                        </a:solidFill>
+                      </a:lnL>
+                      <a:lnR w="18720">
+                        <a:solidFill>
+                          <a:srgbClr val="000000"/>
+                        </a:solidFill>
+                      </a:lnR>
+                      <a:lnT w="18720">
+                        <a:solidFill>
+                          <a:srgbClr val="000000"/>
+                        </a:solidFill>
+                      </a:lnT>
+                      <a:lnB w="18720">
+                        <a:solidFill>
+                          <a:srgbClr val="000000"/>
+                        </a:solidFill>
+                      </a:lnB>
+                      <a:noFill/>
+                    </a:tcPr>
+                  </a:tc>
+                  <a:tc>
+                    <a:txBody>
+                      <a:bodyPr/>
+                      <a:lstStyle/>
+                      <a:p>
+                        <a:pPr algn="ctr">
+                          <a:lnSpc>
+                            <a:spcPct val="100000"/>
+                          </a:lnSpc>
+                        </a:pPr>
+                        <a:r>
+                          <a:rPr lang="ca-ES" sz="1800" b="0" strike="noStrike" spc="-1" dirty="0" smtClean="0">
+                            <a:solidFill>
+                              <a:srgbClr val="FF0000"/>
+                            </a:solidFill>
+                            <a:uFill>
+                              <a:solidFill>
+                                <a:srgbClr val="FFFFFF"/>
+                              </a:solidFill>
+                            </a:uFill>
+                            <a:latin typeface="Arial"/>
+                          </a:rPr>
+                          <a:t>20</a:t>
+                        </a:r>
+                        <a:endParaRPr lang="ca-ES" sz="1800" b="0" strike="noStrike" spc="-1" dirty="0">
+                          <a:solidFill>
+                            <a:srgbClr val="FF0000"/>
+                          </a:solidFill>
+                          <a:uFill>
+                            <a:solidFill>
+                              <a:srgbClr val="FFFFFF"/>
+                            </a:solidFill>
+                          </a:uFill>
+                          <a:latin typeface="Arial"/>
+                        </a:endParaRPr>
+                      </a:p>
+                    </a:txBody>
+                    <a:tcPr anchor="ctr">
+                      <a:lnL w="18720">
+                        <a:solidFill>
+                          <a:srgbClr val="000000"/>
+                        </a:solidFill>
+                      </a:lnL>
+                      <a:lnR w="18720">
+                        <a:solidFill>
+                          <a:srgbClr val="000000"/>
+                        </a:solidFill>
+                      </a:lnR>
+                      <a:lnT w="18720">
+                        <a:solidFill>
+                          <a:srgbClr val="000000"/>
+                        </a:solidFill>
+                      </a:lnT>
+                      <a:lnB w="18720">
+                        <a:solidFill>
+                          <a:srgbClr val="000000"/>
+                        </a:solidFill>
+                      </a:lnB>
+                      <a:noFill/>
+                    </a:tcPr>
+                  </a:tc>
+                  <a:extLst>
+                    <a:ext uri="{0D108BD9-81ED-4DB2-BD59-A6C34878D82A}">
+                      <a16:rowId xmlns:a16="http://schemas.microsoft.com/office/drawing/2014/main" val="10001"/>
+                    </a:ext>
+                  </a:extLst>
+                </a:tr>
+                <a:tr h="950803">
+                  <a:tc>
+                    <a:txBody>
+                      <a:bodyPr/>
+                      <a:lstStyle/>
+                      <a:p>
+                        <a:pPr algn="ctr">
+                          <a:lnSpc>
+                            <a:spcPct val="100000"/>
+                          </a:lnSpc>
+                        </a:pPr>
+                        <a:r>
+                          <a:rPr lang="ca-ES" sz="1800" b="0" strike="noStrike" spc="-1" dirty="0" smtClean="0">
+                            <a:solidFill>
+                              <a:srgbClr val="FFC000"/>
+                            </a:solidFill>
+                            <a:uFill>
+                              <a:solidFill>
+                                <a:srgbClr val="FFFFFF"/>
+                              </a:solidFill>
+                            </a:uFill>
+                            <a:latin typeface="Arial"/>
+                          </a:rPr>
+                          <a:t>0</a:t>
+                        </a:r>
+                        <a:endParaRPr lang="ca-ES" sz="1800" b="0" strike="noStrike" spc="-1" dirty="0">
+                          <a:solidFill>
+                            <a:srgbClr val="FFC000"/>
+                          </a:solidFill>
+                          <a:uFill>
+                            <a:solidFill>
+                              <a:srgbClr val="FFFFFF"/>
+                            </a:solidFill>
+                          </a:uFill>
+                          <a:latin typeface="Arial"/>
+                        </a:endParaRPr>
+                      </a:p>
+                    </a:txBody>
+                    <a:tcPr anchor="ctr">
+                      <a:lnL w="18720">
+                        <a:solidFill>
+                          <a:srgbClr val="000000"/>
+                        </a:solidFill>
+                      </a:lnL>
+                      <a:lnR w="18720">
+                        <a:solidFill>
+                          <a:srgbClr val="000000"/>
+                        </a:solidFill>
+                      </a:lnR>
+                      <a:lnT w="18720">
+                        <a:solidFill>
+                          <a:srgbClr val="000000"/>
+                        </a:solidFill>
+                      </a:lnT>
+                      <a:lnB w="18720">
+                        <a:solidFill>
+                          <a:srgbClr val="000000"/>
+                        </a:solidFill>
+                      </a:lnB>
+                      <a:noFill/>
+                    </a:tcPr>
+                  </a:tc>
+                  <a:tc>
+                    <a:txBody>
+                      <a:bodyPr/>
+                      <a:lstStyle/>
+                      <a:p>
+                        <a:pPr algn="ctr">
+                          <a:lnSpc>
+                            <a:spcPct val="100000"/>
+                          </a:lnSpc>
+                        </a:pPr>
+                        <a:r>
+                          <a:rPr lang="ca-ES" sz="1800" b="0" strike="noStrike" spc="-1" dirty="0" smtClean="0">
+                            <a:solidFill>
+                              <a:srgbClr val="FFC000"/>
+                            </a:solidFill>
+                            <a:uFill>
+                              <a:solidFill>
+                                <a:srgbClr val="FFFFFF"/>
+                              </a:solidFill>
+                            </a:uFill>
+                            <a:latin typeface="Arial"/>
+                          </a:rPr>
+                          <a:t>1</a:t>
+                        </a:r>
+                        <a:endParaRPr lang="ca-ES" sz="1800" b="0" strike="noStrike" spc="-1" dirty="0">
+                          <a:solidFill>
+                            <a:srgbClr val="FFC000"/>
+                          </a:solidFill>
+                          <a:uFill>
+                            <a:solidFill>
+                              <a:srgbClr val="FFFFFF"/>
+                            </a:solidFill>
+                          </a:uFill>
+                          <a:latin typeface="Arial"/>
+                        </a:endParaRPr>
+                      </a:p>
+                    </a:txBody>
+                    <a:tcPr anchor="ctr">
+                      <a:lnL w="18720">
+                        <a:solidFill>
+                          <a:srgbClr val="000000"/>
+                        </a:solidFill>
+                      </a:lnL>
+                      <a:lnR w="18720">
+                        <a:solidFill>
+                          <a:srgbClr val="000000"/>
+                        </a:solidFill>
+                      </a:lnR>
+                      <a:lnT w="18720">
+                        <a:solidFill>
+                          <a:srgbClr val="000000"/>
+                        </a:solidFill>
+                      </a:lnT>
+                      <a:lnB w="18720">
+                        <a:solidFill>
+                          <a:srgbClr val="000000"/>
+                        </a:solidFill>
+                      </a:lnB>
+                      <a:noFill/>
+                    </a:tcPr>
+                  </a:tc>
+                  <a:tc>
+                    <a:txBody>
+                      <a:bodyPr/>
+                      <a:lstStyle/>
+                      <a:p>
+                        <a:pPr algn="ctr">
+                          <a:lnSpc>
+                            <a:spcPct val="100000"/>
+                          </a:lnSpc>
+                        </a:pPr>
+                        <a:r>
+                          <a:rPr lang="ca-ES" sz="1800" b="0" strike="noStrike" spc="-1" dirty="0" smtClean="0">
+                            <a:solidFill>
+                              <a:srgbClr val="FFC000"/>
+                            </a:solidFill>
+                            <a:uFill>
+                              <a:solidFill>
+                                <a:srgbClr val="FFFFFF"/>
+                              </a:solidFill>
+                            </a:uFill>
+                            <a:latin typeface="Arial"/>
+                          </a:rPr>
+                          <a:t>4</a:t>
+                        </a:r>
+                        <a:endParaRPr lang="ca-ES" sz="1800" b="0" strike="noStrike" spc="-1" dirty="0">
+                          <a:solidFill>
+                            <a:srgbClr val="FFC000"/>
+                          </a:solidFill>
+                          <a:uFill>
+                            <a:solidFill>
+                              <a:srgbClr val="FFFFFF"/>
+                            </a:solidFill>
+                          </a:uFill>
+                          <a:latin typeface="Arial"/>
+                        </a:endParaRPr>
+                      </a:p>
+                    </a:txBody>
+                    <a:tcPr anchor="ctr">
+                      <a:lnL w="18720">
+                        <a:solidFill>
+                          <a:srgbClr val="000000"/>
+                        </a:solidFill>
+                      </a:lnL>
+                      <a:lnR w="18720">
+                        <a:solidFill>
+                          <a:srgbClr val="000000"/>
+                        </a:solidFill>
+                      </a:lnR>
+                      <a:lnT w="18720">
+                        <a:solidFill>
+                          <a:srgbClr val="000000"/>
+                        </a:solidFill>
+                      </a:lnT>
+                      <a:lnB w="18720">
+                        <a:solidFill>
+                          <a:srgbClr val="000000"/>
+                        </a:solidFill>
+                      </a:lnB>
+                      <a:noFill/>
+                    </a:tcPr>
+                  </a:tc>
+                  <a:extLst>
+                    <a:ext uri="{0D108BD9-81ED-4DB2-BD59-A6C34878D82A}">
+                      <a16:rowId xmlns:a16="http://schemas.microsoft.com/office/drawing/2014/main" val="10002"/>
+                    </a:ext>
+                  </a:extLst>
+                </a:tr>
+              </a:tbl>
+            </a:graphicData>
+          </a:graphic>
+        </p:graphicFrame>
+        <p:sp>
+          <p:nvSpPr>
+            <p:cNvPr id="6" name="CuadroTexto 5"/>
+            <p:cNvSpPr txBox="1"/>
+            <p:nvPr/>
+          </p:nvSpPr>
+          <p:spPr>
+            <a:xfrm>
+              <a:off x="713232" y="1432560"/>
+              <a:ext cx="374904" cy="369332"/>
+            </a:xfrm>
+            <a:prstGeom prst="rect">
+              <a:avLst/>
+            </a:prstGeom>
+            <a:noFill/>
+          </p:spPr>
+          <p:txBody>
+            <a:bodyPr wrap="square" rtlCol="0">
+              <a:spAutoFit/>
+            </a:bodyPr>
+            <a:lstStyle/>
+            <a:p>
+              <a:r>
+                <a:rPr lang="ca-ES" b="1" dirty="0" smtClean="0"/>
+                <a:t>A</a:t>
+              </a:r>
+              <a:endParaRPr lang="es-ES" b="1" dirty="0"/>
+            </a:p>
+          </p:txBody>
+        </p:sp>
+        <p:sp>
+          <p:nvSpPr>
+            <p:cNvPr id="7" name="CuadroTexto 6"/>
+            <p:cNvSpPr txBox="1"/>
+            <p:nvPr/>
+          </p:nvSpPr>
+          <p:spPr>
+            <a:xfrm>
+              <a:off x="4340352" y="1438656"/>
+              <a:ext cx="374904" cy="369332"/>
+            </a:xfrm>
+            <a:prstGeom prst="rect">
+              <a:avLst/>
+            </a:prstGeom>
+            <a:noFill/>
+          </p:spPr>
+          <p:txBody>
+            <a:bodyPr wrap="square" rtlCol="0">
+              <a:spAutoFit/>
+            </a:bodyPr>
+            <a:lstStyle/>
+            <a:p>
+              <a:r>
+                <a:rPr lang="ca-ES" b="1" dirty="0" smtClean="0"/>
+                <a:t>B</a:t>
+              </a:r>
+              <a:endParaRPr lang="es-ES" b="1" dirty="0"/>
+            </a:p>
+          </p:txBody>
+        </p:sp>
+      </p:grpSp>
+    </p:spTree>
+    <p:extLst>
+      <p:ext uri="{BB962C8B-B14F-4D97-AF65-F5344CB8AC3E}">
+        <p14:creationId xmlns:p14="http://schemas.microsoft.com/office/powerpoint/2010/main" val="807650798"/>
+      </p:ext>
+    </p:extLst>
+  </p:cSld>
+  <p:clrMapOvr>
+    <a:masterClrMapping/>
+  </p:clrMapOvr>
+</p:sld>
+</file>
+
 <file path=ppt/theme/theme1.xml><?xml version="1.0" encoding="utf-8"?>
 <a:theme xmlns:a="http://schemas.openxmlformats.org/drawingml/2006/main" name="Office Theme">
   <a:themeElements>

</xml_diff>